<commit_message>
Traslated lubridate cheatsheet to Portuguese and fixed footer blank spaces of data import cs
</commit_message>
<xml_diff>
--- a/translations/portuguese/data-import_pt_br.pptx
+++ b/translations/portuguese/data-import_pt_br.pptx
@@ -2440,7 +2440,7 @@
           </a:ln>
           <a:extLst>
             <a:ext uri="{C572A759-6A51-4108-AA02-DFA0A04FC94B}">
-              <ma14:wrappingTextBoxFlag xmlns="" xmlns:m="http://schemas.openxmlformats.org/officeDocument/2006/math" xmlns:a14="http://schemas.microsoft.com/office/drawing/2010/main" xmlns:ma14="http://schemas.microsoft.com/office/mac/drawingml/2011/main" val="1"/>
+              <ma14:wrappingTextBoxFlag xmlns:ma14="http://schemas.microsoft.com/office/mac/drawingml/2011/main" xmlns:a14="http://schemas.microsoft.com/office/drawing/2010/main" xmlns:m="http://schemas.openxmlformats.org/officeDocument/2006/math" xmlns="" val="1"/>
             </a:ext>
           </a:extLst>
         </p:spPr>
@@ -2479,7 +2479,7 @@
           </a:ln>
           <a:extLst>
             <a:ext uri="{C572A759-6A51-4108-AA02-DFA0A04FC94B}">
-              <ma14:wrappingTextBoxFlag xmlns="" xmlns:m="http://schemas.openxmlformats.org/officeDocument/2006/math" xmlns:a14="http://schemas.microsoft.com/office/drawing/2010/main" xmlns:ma14="http://schemas.microsoft.com/office/mac/drawingml/2011/main" val="1"/>
+              <ma14:wrappingTextBoxFlag xmlns:ma14="http://schemas.microsoft.com/office/mac/drawingml/2011/main" xmlns:a14="http://schemas.microsoft.com/office/drawing/2010/main" xmlns:m="http://schemas.openxmlformats.org/officeDocument/2006/math" xmlns="" val="1"/>
             </a:ext>
           </a:extLst>
         </p:spPr>
@@ -3631,7 +3631,7 @@
               <a:effectLst/>
               <a:extLst>
                 <a:ext uri="{C572A759-6A51-4108-AA02-DFA0A04FC94B}">
-                  <ma14:wrappingTextBoxFlag xmlns="" xmlns:m="http://schemas.openxmlformats.org/officeDocument/2006/math" xmlns:a14="http://schemas.microsoft.com/office/drawing/2010/main" xmlns:ma14="http://schemas.microsoft.com/office/mac/drawingml/2011/main" val="1"/>
+                  <ma14:wrappingTextBoxFlag xmlns:ma14="http://schemas.microsoft.com/office/mac/drawingml/2011/main" xmlns:a14="http://schemas.microsoft.com/office/drawing/2010/main" xmlns:m="http://schemas.openxmlformats.org/officeDocument/2006/math" xmlns="" val="1"/>
                 </a:ext>
               </a:extLst>
             </p:spPr>
@@ -4179,7 +4179,7 @@
           </a:ln>
           <a:extLst>
             <a:ext uri="{C572A759-6A51-4108-AA02-DFA0A04FC94B}">
-              <ma14:wrappingTextBoxFlag xmlns="" xmlns:m="http://schemas.openxmlformats.org/officeDocument/2006/math" xmlns:a14="http://schemas.microsoft.com/office/drawing/2010/main" xmlns:ma14="http://schemas.microsoft.com/office/mac/drawingml/2011/main" val="1"/>
+              <ma14:wrappingTextBoxFlag xmlns:ma14="http://schemas.microsoft.com/office/mac/drawingml/2011/main" xmlns:a14="http://schemas.microsoft.com/office/drawing/2010/main" xmlns:m="http://schemas.openxmlformats.org/officeDocument/2006/math" xmlns="" val="1"/>
             </a:ext>
           </a:extLst>
         </p:spPr>
@@ -4436,7 +4436,7 @@
               <a:effectLst/>
               <a:extLst>
                 <a:ext uri="{C572A759-6A51-4108-AA02-DFA0A04FC94B}">
-                  <ma14:wrappingTextBoxFlag xmlns="" xmlns:m="http://schemas.openxmlformats.org/officeDocument/2006/math" xmlns:a14="http://schemas.microsoft.com/office/drawing/2010/main" xmlns:ma14="http://schemas.microsoft.com/office/mac/drawingml/2011/main" val="1"/>
+                  <ma14:wrappingTextBoxFlag xmlns:ma14="http://schemas.microsoft.com/office/mac/drawingml/2011/main" xmlns:a14="http://schemas.microsoft.com/office/drawing/2010/main" xmlns:m="http://schemas.openxmlformats.org/officeDocument/2006/math" xmlns="" val="1"/>
                 </a:ext>
               </a:extLst>
             </p:spPr>
@@ -5955,7 +5955,7 @@
           </a:ln>
           <a:extLst>
             <a:ext uri="{C572A759-6A51-4108-AA02-DFA0A04FC94B}">
-              <ma14:wrappingTextBoxFlag xmlns="" xmlns:m="http://schemas.openxmlformats.org/officeDocument/2006/math" xmlns:a14="http://schemas.microsoft.com/office/drawing/2010/main" xmlns:ma14="http://schemas.microsoft.com/office/mac/drawingml/2011/main" val="1"/>
+              <ma14:wrappingTextBoxFlag xmlns:ma14="http://schemas.microsoft.com/office/mac/drawingml/2011/main" xmlns:a14="http://schemas.microsoft.com/office/drawing/2010/main" xmlns:m="http://schemas.openxmlformats.org/officeDocument/2006/math" xmlns="" val="1"/>
             </a:ext>
           </a:extLst>
         </p:spPr>
@@ -6077,7 +6077,7 @@
             </a:pPr>
             <a:r>
               <a:rPr lang="pt-BR" dirty="0"/>
-              <a:t>                                                             Traduzido por: Eric Scopinho  • </a:t>
+              <a:t>                                                               Traduzido por: Eric Scopinho  • </a:t>
             </a:r>
             <a:r>
               <a:rPr lang="pt-BR" dirty="0">
@@ -6189,7 +6189,7 @@
           </a:ln>
           <a:extLst>
             <a:ext uri="{C572A759-6A51-4108-AA02-DFA0A04FC94B}">
-              <ma14:wrappingTextBoxFlag xmlns="" xmlns:m="http://schemas.openxmlformats.org/officeDocument/2006/math" xmlns:a14="http://schemas.microsoft.com/office/drawing/2010/main" xmlns:ma14="http://schemas.microsoft.com/office/mac/drawingml/2011/main" val="1"/>
+              <ma14:wrappingTextBoxFlag xmlns:ma14="http://schemas.microsoft.com/office/mac/drawingml/2011/main" xmlns:a14="http://schemas.microsoft.com/office/drawing/2010/main" xmlns:m="http://schemas.openxmlformats.org/officeDocument/2006/math" xmlns="" val="1"/>
             </a:ext>
           </a:extLst>
         </p:spPr>
@@ -6568,7 +6568,7 @@
           </a:ln>
           <a:extLst>
             <a:ext uri="{C572A759-6A51-4108-AA02-DFA0A04FC94B}">
-              <ma14:wrappingTextBoxFlag xmlns="" xmlns:m="http://schemas.openxmlformats.org/officeDocument/2006/math" xmlns:a14="http://schemas.microsoft.com/office/drawing/2010/main" xmlns:ma14="http://schemas.microsoft.com/office/mac/drawingml/2011/main" val="1"/>
+              <ma14:wrappingTextBoxFlag xmlns:ma14="http://schemas.microsoft.com/office/mac/drawingml/2011/main" xmlns:a14="http://schemas.microsoft.com/office/drawing/2010/main" xmlns:m="http://schemas.openxmlformats.org/officeDocument/2006/math" xmlns="" val="1"/>
             </a:ext>
           </a:extLst>
         </p:spPr>
@@ -6623,7 +6623,7 @@
           </a:ln>
           <a:extLst>
             <a:ext uri="{C572A759-6A51-4108-AA02-DFA0A04FC94B}">
-              <ma14:wrappingTextBoxFlag xmlns="" xmlns:m="http://schemas.openxmlformats.org/officeDocument/2006/math" xmlns:a14="http://schemas.microsoft.com/office/drawing/2010/main" xmlns:ma14="http://schemas.microsoft.com/office/mac/drawingml/2011/main" val="1"/>
+              <ma14:wrappingTextBoxFlag xmlns:ma14="http://schemas.microsoft.com/office/mac/drawingml/2011/main" xmlns:a14="http://schemas.microsoft.com/office/drawing/2010/main" xmlns:m="http://schemas.openxmlformats.org/officeDocument/2006/math" xmlns="" val="1"/>
             </a:ext>
           </a:extLst>
         </p:spPr>
@@ -6661,7 +6661,7 @@
           </a:ln>
           <a:extLst>
             <a:ext uri="{C572A759-6A51-4108-AA02-DFA0A04FC94B}">
-              <ma14:wrappingTextBoxFlag xmlns="" xmlns:m="http://schemas.openxmlformats.org/officeDocument/2006/math" xmlns:a14="http://schemas.microsoft.com/office/drawing/2010/main" xmlns:ma14="http://schemas.microsoft.com/office/mac/drawingml/2011/main" val="1"/>
+              <ma14:wrappingTextBoxFlag xmlns:ma14="http://schemas.microsoft.com/office/mac/drawingml/2011/main" xmlns:a14="http://schemas.microsoft.com/office/drawing/2010/main" xmlns:m="http://schemas.openxmlformats.org/officeDocument/2006/math" xmlns="" val="1"/>
             </a:ext>
           </a:extLst>
         </p:spPr>
@@ -6731,7 +6731,7 @@
           <a:effectLst/>
           <a:extLst>
             <a:ext uri="{C572A759-6A51-4108-AA02-DFA0A04FC94B}">
-              <ma14:wrappingTextBoxFlag xmlns="" xmlns:m="http://schemas.openxmlformats.org/officeDocument/2006/math" xmlns:a14="http://schemas.microsoft.com/office/drawing/2010/main" xmlns:ma14="http://schemas.microsoft.com/office/mac/drawingml/2011/main" val="1"/>
+              <ma14:wrappingTextBoxFlag xmlns:ma14="http://schemas.microsoft.com/office/mac/drawingml/2011/main" xmlns:a14="http://schemas.microsoft.com/office/drawing/2010/main" xmlns:m="http://schemas.openxmlformats.org/officeDocument/2006/math" xmlns="" val="1"/>
             </a:ext>
           </a:extLst>
         </p:spPr>
@@ -7004,7 +7004,7 @@
           <a:effectLst/>
           <a:extLst>
             <a:ext uri="{C572A759-6A51-4108-AA02-DFA0A04FC94B}">
-              <ma14:wrappingTextBoxFlag xmlns="" xmlns:m="http://schemas.openxmlformats.org/officeDocument/2006/math" xmlns:a14="http://schemas.microsoft.com/office/drawing/2010/main" xmlns:ma14="http://schemas.microsoft.com/office/mac/drawingml/2011/main" val="1"/>
+              <ma14:wrappingTextBoxFlag xmlns:ma14="http://schemas.microsoft.com/office/mac/drawingml/2011/main" xmlns:a14="http://schemas.microsoft.com/office/drawing/2010/main" xmlns:m="http://schemas.openxmlformats.org/officeDocument/2006/math" xmlns="" val="1"/>
             </a:ext>
           </a:extLst>
         </p:spPr>
@@ -7156,7 +7156,7 @@
           <a:effectLst/>
           <a:extLst>
             <a:ext uri="{C572A759-6A51-4108-AA02-DFA0A04FC94B}">
-              <ma14:wrappingTextBoxFlag xmlns="" xmlns:m="http://schemas.openxmlformats.org/officeDocument/2006/math" xmlns:a14="http://schemas.microsoft.com/office/drawing/2010/main" xmlns:ma14="http://schemas.microsoft.com/office/mac/drawingml/2011/main" val="1"/>
+              <ma14:wrappingTextBoxFlag xmlns:ma14="http://schemas.microsoft.com/office/mac/drawingml/2011/main" xmlns:a14="http://schemas.microsoft.com/office/drawing/2010/main" xmlns:m="http://schemas.openxmlformats.org/officeDocument/2006/math" xmlns="" val="1"/>
             </a:ext>
           </a:extLst>
         </p:spPr>
@@ -7303,7 +7303,7 @@
           <a:effectLst/>
           <a:extLst>
             <a:ext uri="{C572A759-6A51-4108-AA02-DFA0A04FC94B}">
-              <ma14:wrappingTextBoxFlag xmlns="" xmlns:m="http://schemas.openxmlformats.org/officeDocument/2006/math" xmlns:a14="http://schemas.microsoft.com/office/drawing/2010/main" xmlns:ma14="http://schemas.microsoft.com/office/mac/drawingml/2011/main" val="1"/>
+              <ma14:wrappingTextBoxFlag xmlns:ma14="http://schemas.microsoft.com/office/mac/drawingml/2011/main" xmlns:a14="http://schemas.microsoft.com/office/drawing/2010/main" xmlns:m="http://schemas.openxmlformats.org/officeDocument/2006/math" xmlns="" val="1"/>
             </a:ext>
           </a:extLst>
         </p:spPr>
@@ -7366,7 +7366,7 @@
           </a:ln>
           <a:extLst>
             <a:ext uri="{C572A759-6A51-4108-AA02-DFA0A04FC94B}">
-              <ma14:wrappingTextBoxFlag xmlns="" xmlns:m="http://schemas.openxmlformats.org/officeDocument/2006/math" xmlns:a14="http://schemas.microsoft.com/office/drawing/2010/main" xmlns:ma14="http://schemas.microsoft.com/office/mac/drawingml/2011/main" val="1"/>
+              <ma14:wrappingTextBoxFlag xmlns:ma14="http://schemas.microsoft.com/office/mac/drawingml/2011/main" xmlns:a14="http://schemas.microsoft.com/office/drawing/2010/main" xmlns:m="http://schemas.openxmlformats.org/officeDocument/2006/math" xmlns="" val="1"/>
             </a:ext>
           </a:extLst>
         </p:spPr>
@@ -7662,7 +7662,7 @@
           </a:ln>
           <a:extLst>
             <a:ext uri="{C572A759-6A51-4108-AA02-DFA0A04FC94B}">
-              <ma14:wrappingTextBoxFlag xmlns="" xmlns:m="http://schemas.openxmlformats.org/officeDocument/2006/math" xmlns:a14="http://schemas.microsoft.com/office/drawing/2010/main" xmlns:ma14="http://schemas.microsoft.com/office/mac/drawingml/2011/main" val="1"/>
+              <ma14:wrappingTextBoxFlag xmlns:ma14="http://schemas.microsoft.com/office/mac/drawingml/2011/main" xmlns:a14="http://schemas.microsoft.com/office/drawing/2010/main" xmlns:m="http://schemas.openxmlformats.org/officeDocument/2006/math" xmlns="" val="1"/>
             </a:ext>
           </a:extLst>
         </p:spPr>
@@ -7700,7 +7700,7 @@
           </a:ln>
           <a:extLst>
             <a:ext uri="{C572A759-6A51-4108-AA02-DFA0A04FC94B}">
-              <ma14:wrappingTextBoxFlag xmlns="" xmlns:m="http://schemas.openxmlformats.org/officeDocument/2006/math" xmlns:a14="http://schemas.microsoft.com/office/drawing/2010/main" xmlns:ma14="http://schemas.microsoft.com/office/mac/drawingml/2011/main" val="1"/>
+              <ma14:wrappingTextBoxFlag xmlns:ma14="http://schemas.microsoft.com/office/mac/drawingml/2011/main" xmlns:a14="http://schemas.microsoft.com/office/drawing/2010/main" xmlns:m="http://schemas.openxmlformats.org/officeDocument/2006/math" xmlns="" val="1"/>
             </a:ext>
           </a:extLst>
         </p:spPr>
@@ -7856,7 +7856,7 @@
           </a:ln>
           <a:extLst>
             <a:ext uri="{C572A759-6A51-4108-AA02-DFA0A04FC94B}">
-              <ma14:wrappingTextBoxFlag xmlns="" xmlns:m="http://schemas.openxmlformats.org/officeDocument/2006/math" xmlns:a14="http://schemas.microsoft.com/office/drawing/2010/main" xmlns:ma14="http://schemas.microsoft.com/office/mac/drawingml/2011/main" val="1"/>
+              <ma14:wrappingTextBoxFlag xmlns:ma14="http://schemas.microsoft.com/office/mac/drawingml/2011/main" xmlns:a14="http://schemas.microsoft.com/office/drawing/2010/main" xmlns:m="http://schemas.openxmlformats.org/officeDocument/2006/math" xmlns="" val="1"/>
             </a:ext>
           </a:extLst>
         </p:spPr>
@@ -8455,7 +8455,7 @@
           </a:ln>
           <a:extLst>
             <a:ext uri="{C572A759-6A51-4108-AA02-DFA0A04FC94B}">
-              <ma14:wrappingTextBoxFlag xmlns="" xmlns:m="http://schemas.openxmlformats.org/officeDocument/2006/math" xmlns:a14="http://schemas.microsoft.com/office/drawing/2010/main" xmlns:ma14="http://schemas.microsoft.com/office/mac/drawingml/2011/main" val="1"/>
+              <ma14:wrappingTextBoxFlag xmlns:ma14="http://schemas.microsoft.com/office/mac/drawingml/2011/main" xmlns:a14="http://schemas.microsoft.com/office/drawing/2010/main" xmlns:m="http://schemas.openxmlformats.org/officeDocument/2006/math" xmlns="" val="1"/>
             </a:ext>
           </a:extLst>
         </p:spPr>
@@ -9820,7 +9820,7 @@
           </a:ln>
           <a:extLst>
             <a:ext uri="{C572A759-6A51-4108-AA02-DFA0A04FC94B}">
-              <ma14:wrappingTextBoxFlag xmlns="" xmlns:m="http://schemas.openxmlformats.org/officeDocument/2006/math" xmlns:a14="http://schemas.microsoft.com/office/drawing/2010/main" xmlns:ma14="http://schemas.microsoft.com/office/mac/drawingml/2011/main" val="1"/>
+              <ma14:wrappingTextBoxFlag xmlns:ma14="http://schemas.microsoft.com/office/mac/drawingml/2011/main" xmlns:a14="http://schemas.microsoft.com/office/drawing/2010/main" xmlns:m="http://schemas.openxmlformats.org/officeDocument/2006/math" xmlns="" val="1"/>
             </a:ext>
           </a:extLst>
         </p:spPr>
@@ -10118,7 +10118,7 @@
           </a:ln>
           <a:extLst>
             <a:ext uri="{C572A759-6A51-4108-AA02-DFA0A04FC94B}">
-              <ma14:wrappingTextBoxFlag xmlns="" xmlns:m="http://schemas.openxmlformats.org/officeDocument/2006/math" xmlns:a14="http://schemas.microsoft.com/office/drawing/2010/main" xmlns:ma14="http://schemas.microsoft.com/office/mac/drawingml/2011/main" val="1"/>
+              <ma14:wrappingTextBoxFlag xmlns:ma14="http://schemas.microsoft.com/office/mac/drawingml/2011/main" xmlns:a14="http://schemas.microsoft.com/office/drawing/2010/main" xmlns:m="http://schemas.openxmlformats.org/officeDocument/2006/math" xmlns="" val="1"/>
             </a:ext>
           </a:extLst>
         </p:spPr>
@@ -10444,7 +10444,7 @@
           </a:ln>
           <a:extLst>
             <a:ext uri="{C572A759-6A51-4108-AA02-DFA0A04FC94B}">
-              <ma14:wrappingTextBoxFlag xmlns="" xmlns:m="http://schemas.openxmlformats.org/officeDocument/2006/math" xmlns:a14="http://schemas.microsoft.com/office/drawing/2010/main" xmlns:ma14="http://schemas.microsoft.com/office/mac/drawingml/2011/main" val="1"/>
+              <ma14:wrappingTextBoxFlag xmlns:ma14="http://schemas.microsoft.com/office/mac/drawingml/2011/main" xmlns:a14="http://schemas.microsoft.com/office/drawing/2010/main" xmlns:m="http://schemas.openxmlformats.org/officeDocument/2006/math" xmlns="" val="1"/>
             </a:ext>
           </a:extLst>
         </p:spPr>
@@ -10557,7 +10557,7 @@
           </a:ln>
           <a:extLst>
             <a:ext uri="{C572A759-6A51-4108-AA02-DFA0A04FC94B}">
-              <ma14:wrappingTextBoxFlag xmlns="" xmlns:m="http://schemas.openxmlformats.org/officeDocument/2006/math" xmlns:a14="http://schemas.microsoft.com/office/drawing/2010/main" xmlns:ma14="http://schemas.microsoft.com/office/mac/drawingml/2011/main" val="1"/>
+              <ma14:wrappingTextBoxFlag xmlns:ma14="http://schemas.microsoft.com/office/mac/drawingml/2011/main" xmlns:a14="http://schemas.microsoft.com/office/drawing/2010/main" xmlns:m="http://schemas.openxmlformats.org/officeDocument/2006/math" xmlns="" val="1"/>
             </a:ext>
           </a:extLst>
         </p:spPr>
@@ -10722,7 +10722,7 @@
           </a:ln>
           <a:extLst>
             <a:ext uri="{C572A759-6A51-4108-AA02-DFA0A04FC94B}">
-              <ma14:wrappingTextBoxFlag xmlns="" xmlns:m="http://schemas.openxmlformats.org/officeDocument/2006/math" xmlns:a14="http://schemas.microsoft.com/office/drawing/2010/main" xmlns:ma14="http://schemas.microsoft.com/office/mac/drawingml/2011/main" val="1"/>
+              <ma14:wrappingTextBoxFlag xmlns:ma14="http://schemas.microsoft.com/office/mac/drawingml/2011/main" xmlns:a14="http://schemas.microsoft.com/office/drawing/2010/main" xmlns:m="http://schemas.openxmlformats.org/officeDocument/2006/math" xmlns="" val="1"/>
             </a:ext>
           </a:extLst>
         </p:spPr>
@@ -11440,7 +11440,7 @@
           </a:ln>
           <a:extLst>
             <a:ext uri="{C572A759-6A51-4108-AA02-DFA0A04FC94B}">
-              <ma14:wrappingTextBoxFlag xmlns="" xmlns:m="http://schemas.openxmlformats.org/officeDocument/2006/math" xmlns:a14="http://schemas.microsoft.com/office/drawing/2010/main" xmlns:ma14="http://schemas.microsoft.com/office/mac/drawingml/2011/main" val="1"/>
+              <ma14:wrappingTextBoxFlag xmlns:ma14="http://schemas.microsoft.com/office/mac/drawingml/2011/main" xmlns:a14="http://schemas.microsoft.com/office/drawing/2010/main" xmlns:m="http://schemas.openxmlformats.org/officeDocument/2006/math" xmlns="" val="1"/>
             </a:ext>
           </a:extLst>
         </p:spPr>
@@ -11514,7 +11514,7 @@
           </a:ln>
           <a:extLst>
             <a:ext uri="{C572A759-6A51-4108-AA02-DFA0A04FC94B}">
-              <ma14:wrappingTextBoxFlag xmlns="" xmlns:m="http://schemas.openxmlformats.org/officeDocument/2006/math" xmlns:a14="http://schemas.microsoft.com/office/drawing/2010/main" xmlns:ma14="http://schemas.microsoft.com/office/mac/drawingml/2011/main" val="1"/>
+              <ma14:wrappingTextBoxFlag xmlns:ma14="http://schemas.microsoft.com/office/mac/drawingml/2011/main" xmlns:a14="http://schemas.microsoft.com/office/drawing/2010/main" xmlns:m="http://schemas.openxmlformats.org/officeDocument/2006/math" xmlns="" val="1"/>
             </a:ext>
           </a:extLst>
         </p:spPr>
@@ -12040,7 +12040,7 @@
               <a:effectLst/>
               <a:extLst>
                 <a:ext uri="{C572A759-6A51-4108-AA02-DFA0A04FC94B}">
-                  <ma14:wrappingTextBoxFlag xmlns="" xmlns:m="http://schemas.openxmlformats.org/officeDocument/2006/math" xmlns:a14="http://schemas.microsoft.com/office/drawing/2010/main" xmlns:ma14="http://schemas.microsoft.com/office/mac/drawingml/2011/main" val="1"/>
+                  <ma14:wrappingTextBoxFlag xmlns:ma14="http://schemas.microsoft.com/office/mac/drawingml/2011/main" xmlns:a14="http://schemas.microsoft.com/office/drawing/2010/main" xmlns:m="http://schemas.openxmlformats.org/officeDocument/2006/math" xmlns="" val="1"/>
                 </a:ext>
               </a:extLst>
             </p:spPr>
@@ -12536,7 +12536,7 @@
           </a:ln>
           <a:extLst>
             <a:ext uri="{C572A759-6A51-4108-AA02-DFA0A04FC94B}">
-              <ma14:wrappingTextBoxFlag xmlns="" xmlns:m="http://schemas.openxmlformats.org/officeDocument/2006/math" xmlns:a14="http://schemas.microsoft.com/office/drawing/2010/main" xmlns:ma14="http://schemas.microsoft.com/office/mac/drawingml/2011/main" val="1"/>
+              <ma14:wrappingTextBoxFlag xmlns:ma14="http://schemas.microsoft.com/office/mac/drawingml/2011/main" xmlns:a14="http://schemas.microsoft.com/office/drawing/2010/main" xmlns:m="http://schemas.openxmlformats.org/officeDocument/2006/math" xmlns="" val="1"/>
             </a:ext>
           </a:extLst>
         </p:spPr>
@@ -12705,7 +12705,7 @@
           </a:ln>
           <a:extLst>
             <a:ext uri="{C572A759-6A51-4108-AA02-DFA0A04FC94B}">
-              <ma14:wrappingTextBoxFlag xmlns="" xmlns:m="http://schemas.openxmlformats.org/officeDocument/2006/math" xmlns:a14="http://schemas.microsoft.com/office/drawing/2010/main" xmlns:ma14="http://schemas.microsoft.com/office/mac/drawingml/2011/main" val="1"/>
+              <ma14:wrappingTextBoxFlag xmlns:ma14="http://schemas.microsoft.com/office/mac/drawingml/2011/main" xmlns:a14="http://schemas.microsoft.com/office/drawing/2010/main" xmlns:m="http://schemas.openxmlformats.org/officeDocument/2006/math" xmlns="" val="1"/>
             </a:ext>
           </a:extLst>
         </p:spPr>
@@ -13187,7 +13187,7 @@
           </a:ln>
           <a:extLst>
             <a:ext uri="{C572A759-6A51-4108-AA02-DFA0A04FC94B}">
-              <ma14:wrappingTextBoxFlag xmlns="" xmlns:m="http://schemas.openxmlformats.org/officeDocument/2006/math" xmlns:a14="http://schemas.microsoft.com/office/drawing/2010/main" xmlns:ma14="http://schemas.microsoft.com/office/mac/drawingml/2011/main" val="1"/>
+              <ma14:wrappingTextBoxFlag xmlns:ma14="http://schemas.microsoft.com/office/mac/drawingml/2011/main" xmlns:a14="http://schemas.microsoft.com/office/drawing/2010/main" xmlns:m="http://schemas.openxmlformats.org/officeDocument/2006/math" xmlns="" val="1"/>
             </a:ext>
           </a:extLst>
         </p:spPr>
@@ -13535,7 +13535,7 @@
               <a:effectLst/>
               <a:extLst>
                 <a:ext uri="{C572A759-6A51-4108-AA02-DFA0A04FC94B}">
-                  <ma14:wrappingTextBoxFlag xmlns="" xmlns:m="http://schemas.openxmlformats.org/officeDocument/2006/math" xmlns:a14="http://schemas.microsoft.com/office/drawing/2010/main" xmlns:ma14="http://schemas.microsoft.com/office/mac/drawingml/2011/main" val="1"/>
+                  <ma14:wrappingTextBoxFlag xmlns:ma14="http://schemas.microsoft.com/office/mac/drawingml/2011/main" xmlns:a14="http://schemas.microsoft.com/office/drawing/2010/main" xmlns:m="http://schemas.openxmlformats.org/officeDocument/2006/math" xmlns="" val="1"/>
                 </a:ext>
               </a:extLst>
             </p:spPr>
@@ -14194,7 +14194,7 @@
               <a:effectLst/>
               <a:extLst>
                 <a:ext uri="{C572A759-6A51-4108-AA02-DFA0A04FC94B}">
-                  <ma14:wrappingTextBoxFlag xmlns="" xmlns:m="http://schemas.openxmlformats.org/officeDocument/2006/math" xmlns:a14="http://schemas.microsoft.com/office/drawing/2010/main" xmlns:ma14="http://schemas.microsoft.com/office/mac/drawingml/2011/main" val="1"/>
+                  <ma14:wrappingTextBoxFlag xmlns:ma14="http://schemas.microsoft.com/office/mac/drawingml/2011/main" xmlns:a14="http://schemas.microsoft.com/office/drawing/2010/main" xmlns:m="http://schemas.openxmlformats.org/officeDocument/2006/math" xmlns="" val="1"/>
                 </a:ext>
               </a:extLst>
             </p:spPr>
@@ -15477,7 +15477,7 @@
           </a:ln>
           <a:extLst>
             <a:ext uri="{C572A759-6A51-4108-AA02-DFA0A04FC94B}">
-              <ma14:wrappingTextBoxFlag xmlns="" xmlns:m="http://schemas.openxmlformats.org/officeDocument/2006/math" xmlns:a14="http://schemas.microsoft.com/office/drawing/2010/main" xmlns:ma14="http://schemas.microsoft.com/office/mac/drawingml/2011/main" val="1"/>
+              <ma14:wrappingTextBoxFlag xmlns:ma14="http://schemas.microsoft.com/office/mac/drawingml/2011/main" xmlns:a14="http://schemas.microsoft.com/office/drawing/2010/main" xmlns:m="http://schemas.openxmlformats.org/officeDocument/2006/math" xmlns="" val="1"/>
             </a:ext>
           </a:extLst>
         </p:spPr>
@@ -15587,7 +15587,7 @@
           </a:ln>
           <a:extLst>
             <a:ext uri="{C572A759-6A51-4108-AA02-DFA0A04FC94B}">
-              <ma14:wrappingTextBoxFlag xmlns="" xmlns:m="http://schemas.openxmlformats.org/officeDocument/2006/math" xmlns:a14="http://schemas.microsoft.com/office/drawing/2010/main" xmlns:ma14="http://schemas.microsoft.com/office/mac/drawingml/2011/main" val="1"/>
+              <ma14:wrappingTextBoxFlag xmlns:ma14="http://schemas.microsoft.com/office/mac/drawingml/2011/main" xmlns:a14="http://schemas.microsoft.com/office/drawing/2010/main" xmlns:m="http://schemas.openxmlformats.org/officeDocument/2006/math" xmlns="" val="1"/>
             </a:ext>
           </a:extLst>
         </p:spPr>
@@ -15920,7 +15920,7 @@
           </a:ln>
           <a:extLst>
             <a:ext uri="{C572A759-6A51-4108-AA02-DFA0A04FC94B}">
-              <ma14:wrappingTextBoxFlag xmlns="" xmlns:m="http://schemas.openxmlformats.org/officeDocument/2006/math" xmlns:a14="http://schemas.microsoft.com/office/drawing/2010/main" xmlns:ma14="http://schemas.microsoft.com/office/mac/drawingml/2011/main" val="1"/>
+              <ma14:wrappingTextBoxFlag xmlns:ma14="http://schemas.microsoft.com/office/mac/drawingml/2011/main" xmlns:a14="http://schemas.microsoft.com/office/drawing/2010/main" xmlns:m="http://schemas.openxmlformats.org/officeDocument/2006/math" xmlns="" val="1"/>
             </a:ext>
           </a:extLst>
         </p:spPr>
@@ -17404,7 +17404,7 @@
           </a:ln>
           <a:extLst>
             <a:ext uri="{C572A759-6A51-4108-AA02-DFA0A04FC94B}">
-              <ma14:wrappingTextBoxFlag xmlns="" xmlns:m="http://schemas.openxmlformats.org/officeDocument/2006/math" xmlns:a14="http://schemas.microsoft.com/office/drawing/2010/main" xmlns:ma14="http://schemas.microsoft.com/office/mac/drawingml/2011/main" val="1"/>
+              <ma14:wrappingTextBoxFlag xmlns:ma14="http://schemas.microsoft.com/office/mac/drawingml/2011/main" xmlns:a14="http://schemas.microsoft.com/office/drawing/2010/main" xmlns:m="http://schemas.openxmlformats.org/officeDocument/2006/math" xmlns="" val="1"/>
             </a:ext>
           </a:extLst>
         </p:spPr>
@@ -17466,7 +17466,7 @@
           </a:ln>
           <a:extLst>
             <a:ext uri="{C572A759-6A51-4108-AA02-DFA0A04FC94B}">
-              <ma14:wrappingTextBoxFlag xmlns="" xmlns:m="http://schemas.openxmlformats.org/officeDocument/2006/math" xmlns:a14="http://schemas.microsoft.com/office/drawing/2010/main" xmlns:ma14="http://schemas.microsoft.com/office/mac/drawingml/2011/main" val="1"/>
+              <ma14:wrappingTextBoxFlag xmlns:ma14="http://schemas.microsoft.com/office/mac/drawingml/2011/main" xmlns:a14="http://schemas.microsoft.com/office/drawing/2010/main" xmlns:m="http://schemas.openxmlformats.org/officeDocument/2006/math" xmlns="" val="1"/>
             </a:ext>
           </a:extLst>
         </p:spPr>
@@ -17523,7 +17523,7 @@
           </a:ln>
           <a:extLst>
             <a:ext uri="{C572A759-6A51-4108-AA02-DFA0A04FC94B}">
-              <ma14:wrappingTextBoxFlag xmlns="" xmlns:m="http://schemas.openxmlformats.org/officeDocument/2006/math" xmlns:a14="http://schemas.microsoft.com/office/drawing/2010/main" xmlns:ma14="http://schemas.microsoft.com/office/mac/drawingml/2011/main" val="1"/>
+              <ma14:wrappingTextBoxFlag xmlns:ma14="http://schemas.microsoft.com/office/mac/drawingml/2011/main" xmlns:a14="http://schemas.microsoft.com/office/drawing/2010/main" xmlns:m="http://schemas.openxmlformats.org/officeDocument/2006/math" xmlns="" val="1"/>
             </a:ext>
           </a:extLst>
         </p:spPr>
@@ -17613,7 +17613,7 @@
           </a:ln>
           <a:extLst>
             <a:ext uri="{C572A759-6A51-4108-AA02-DFA0A04FC94B}">
-              <ma14:wrappingTextBoxFlag xmlns="" xmlns:m="http://schemas.openxmlformats.org/officeDocument/2006/math" xmlns:a14="http://schemas.microsoft.com/office/drawing/2010/main" xmlns:ma14="http://schemas.microsoft.com/office/mac/drawingml/2011/main" val="1"/>
+              <ma14:wrappingTextBoxFlag xmlns:ma14="http://schemas.microsoft.com/office/mac/drawingml/2011/main" xmlns:a14="http://schemas.microsoft.com/office/drawing/2010/main" xmlns:m="http://schemas.openxmlformats.org/officeDocument/2006/math" xmlns="" val="1"/>
             </a:ext>
           </a:extLst>
         </p:spPr>
@@ -17740,7 +17740,7 @@
             </a:pPr>
             <a:r>
               <a:rPr lang="pt-BR" dirty="0"/>
-              <a:t>              Traduzido por: Eric Scopinho  • </a:t>
+              <a:t>                      Traduzido por: Eric Scopinho  • </a:t>
             </a:r>
             <a:r>
               <a:rPr lang="pt-BR" dirty="0">
@@ -17798,7 +17798,7 @@
           </a:ln>
           <a:extLst>
             <a:ext uri="{C572A759-6A51-4108-AA02-DFA0A04FC94B}">
-              <ma14:wrappingTextBoxFlag xmlns="" xmlns:m="http://schemas.openxmlformats.org/officeDocument/2006/math" xmlns:a14="http://schemas.microsoft.com/office/drawing/2010/main" xmlns:ma14="http://schemas.microsoft.com/office/mac/drawingml/2011/main" val="1"/>
+              <ma14:wrappingTextBoxFlag xmlns:ma14="http://schemas.microsoft.com/office/mac/drawingml/2011/main" xmlns:a14="http://schemas.microsoft.com/office/drawing/2010/main" xmlns:m="http://schemas.openxmlformats.org/officeDocument/2006/math" xmlns="" val="1"/>
             </a:ext>
           </a:extLst>
         </p:spPr>
@@ -17890,7 +17890,7 @@
           </a:ln>
           <a:extLst>
             <a:ext uri="{C572A759-6A51-4108-AA02-DFA0A04FC94B}">
-              <ma14:wrappingTextBoxFlag xmlns="" xmlns:m="http://schemas.openxmlformats.org/officeDocument/2006/math" xmlns:a14="http://schemas.microsoft.com/office/drawing/2010/main" xmlns:ma14="http://schemas.microsoft.com/office/mac/drawingml/2011/main" val="1"/>
+              <ma14:wrappingTextBoxFlag xmlns:ma14="http://schemas.microsoft.com/office/mac/drawingml/2011/main" xmlns:a14="http://schemas.microsoft.com/office/drawing/2010/main" xmlns:m="http://schemas.openxmlformats.org/officeDocument/2006/math" xmlns="" val="1"/>
             </a:ext>
           </a:extLst>
         </p:spPr>
@@ -18036,7 +18036,7 @@
           </a:ln>
           <a:extLst>
             <a:ext uri="{C572A759-6A51-4108-AA02-DFA0A04FC94B}">
-              <ma14:wrappingTextBoxFlag xmlns="" xmlns:m="http://schemas.openxmlformats.org/officeDocument/2006/math" xmlns:a14="http://schemas.microsoft.com/office/drawing/2010/main" xmlns:ma14="http://schemas.microsoft.com/office/mac/drawingml/2011/main" val="1"/>
+              <ma14:wrappingTextBoxFlag xmlns:ma14="http://schemas.microsoft.com/office/mac/drawingml/2011/main" xmlns:a14="http://schemas.microsoft.com/office/drawing/2010/main" xmlns:m="http://schemas.openxmlformats.org/officeDocument/2006/math" xmlns="" val="1"/>
             </a:ext>
           </a:extLst>
         </p:spPr>
@@ -18084,7 +18084,7 @@
           </a:ln>
           <a:extLst>
             <a:ext uri="{C572A759-6A51-4108-AA02-DFA0A04FC94B}">
-              <ma14:wrappingTextBoxFlag xmlns="" xmlns:m="http://schemas.openxmlformats.org/officeDocument/2006/math" xmlns:a14="http://schemas.microsoft.com/office/drawing/2010/main" xmlns:ma14="http://schemas.microsoft.com/office/mac/drawingml/2011/main" val="1"/>
+              <ma14:wrappingTextBoxFlag xmlns:ma14="http://schemas.microsoft.com/office/mac/drawingml/2011/main" xmlns:a14="http://schemas.microsoft.com/office/drawing/2010/main" xmlns:m="http://schemas.openxmlformats.org/officeDocument/2006/math" xmlns="" val="1"/>
             </a:ext>
           </a:extLst>
         </p:spPr>
@@ -18263,7 +18263,7 @@
           </a:ln>
           <a:extLst>
             <a:ext uri="{C572A759-6A51-4108-AA02-DFA0A04FC94B}">
-              <ma14:wrappingTextBoxFlag xmlns="" xmlns:m="http://schemas.openxmlformats.org/officeDocument/2006/math" xmlns:a14="http://schemas.microsoft.com/office/drawing/2010/main" xmlns:ma14="http://schemas.microsoft.com/office/mac/drawingml/2011/main" val="1"/>
+              <ma14:wrappingTextBoxFlag xmlns:ma14="http://schemas.microsoft.com/office/mac/drawingml/2011/main" xmlns:a14="http://schemas.microsoft.com/office/drawing/2010/main" xmlns:m="http://schemas.openxmlformats.org/officeDocument/2006/math" xmlns="" val="1"/>
             </a:ext>
           </a:extLst>
         </p:spPr>
@@ -18310,7 +18310,7 @@
           </a:ln>
           <a:extLst>
             <a:ext uri="{C572A759-6A51-4108-AA02-DFA0A04FC94B}">
-              <ma14:wrappingTextBoxFlag xmlns="" xmlns:m="http://schemas.openxmlformats.org/officeDocument/2006/math" xmlns:a14="http://schemas.microsoft.com/office/drawing/2010/main" xmlns:ma14="http://schemas.microsoft.com/office/mac/drawingml/2011/main" val="1"/>
+              <ma14:wrappingTextBoxFlag xmlns:ma14="http://schemas.microsoft.com/office/mac/drawingml/2011/main" xmlns:a14="http://schemas.microsoft.com/office/drawing/2010/main" xmlns:m="http://schemas.openxmlformats.org/officeDocument/2006/math" xmlns="" val="1"/>
             </a:ext>
           </a:extLst>
         </p:spPr>
@@ -18608,7 +18608,7 @@
           </a:ln>
           <a:extLst>
             <a:ext uri="{C572A759-6A51-4108-AA02-DFA0A04FC94B}">
-              <ma14:wrappingTextBoxFlag xmlns="" xmlns:m="http://schemas.openxmlformats.org/officeDocument/2006/math" xmlns:a14="http://schemas.microsoft.com/office/drawing/2010/main" xmlns:ma14="http://schemas.microsoft.com/office/mac/drawingml/2011/main" val="1"/>
+              <ma14:wrappingTextBoxFlag xmlns:ma14="http://schemas.microsoft.com/office/mac/drawingml/2011/main" xmlns:a14="http://schemas.microsoft.com/office/drawing/2010/main" xmlns:m="http://schemas.openxmlformats.org/officeDocument/2006/math" xmlns="" val="1"/>
             </a:ext>
           </a:extLst>
         </p:spPr>
@@ -18805,7 +18805,7 @@
           </a:ln>
           <a:extLst>
             <a:ext uri="{C572A759-6A51-4108-AA02-DFA0A04FC94B}">
-              <ma14:wrappingTextBoxFlag xmlns="" xmlns:m="http://schemas.openxmlformats.org/officeDocument/2006/math" xmlns:a14="http://schemas.microsoft.com/office/drawing/2010/main" xmlns:ma14="http://schemas.microsoft.com/office/mac/drawingml/2011/main" val="1"/>
+              <ma14:wrappingTextBoxFlag xmlns:ma14="http://schemas.microsoft.com/office/mac/drawingml/2011/main" xmlns:a14="http://schemas.microsoft.com/office/drawing/2010/main" xmlns:m="http://schemas.openxmlformats.org/officeDocument/2006/math" xmlns="" val="1"/>
             </a:ext>
           </a:extLst>
         </p:spPr>
@@ -18849,7 +18849,7 @@
           </a:ln>
           <a:extLst>
             <a:ext uri="{C572A759-6A51-4108-AA02-DFA0A04FC94B}">
-              <ma14:wrappingTextBoxFlag xmlns="" xmlns:m="http://schemas.openxmlformats.org/officeDocument/2006/math" xmlns:a14="http://schemas.microsoft.com/office/drawing/2010/main" xmlns:ma14="http://schemas.microsoft.com/office/mac/drawingml/2011/main" val="1"/>
+              <ma14:wrappingTextBoxFlag xmlns:ma14="http://schemas.microsoft.com/office/mac/drawingml/2011/main" xmlns:a14="http://schemas.microsoft.com/office/drawing/2010/main" xmlns:m="http://schemas.openxmlformats.org/officeDocument/2006/math" xmlns="" val="1"/>
             </a:ext>
           </a:extLst>
         </p:spPr>
@@ -19251,7 +19251,7 @@
           </a:ln>
           <a:extLst>
             <a:ext uri="{C572A759-6A51-4108-AA02-DFA0A04FC94B}">
-              <ma14:wrappingTextBoxFlag xmlns="" xmlns:m="http://schemas.openxmlformats.org/officeDocument/2006/math" xmlns:a14="http://schemas.microsoft.com/office/drawing/2010/main" xmlns:ma14="http://schemas.microsoft.com/office/mac/drawingml/2011/main" val="1"/>
+              <ma14:wrappingTextBoxFlag xmlns:ma14="http://schemas.microsoft.com/office/mac/drawingml/2011/main" xmlns:a14="http://schemas.microsoft.com/office/drawing/2010/main" xmlns:m="http://schemas.openxmlformats.org/officeDocument/2006/math" xmlns="" val="1"/>
             </a:ext>
           </a:extLst>
         </p:spPr>
@@ -19402,7 +19402,7 @@
           </a:ln>
           <a:extLst>
             <a:ext uri="{C572A759-6A51-4108-AA02-DFA0A04FC94B}">
-              <ma14:wrappingTextBoxFlag xmlns="" xmlns:m="http://schemas.openxmlformats.org/officeDocument/2006/math" xmlns:a14="http://schemas.microsoft.com/office/drawing/2010/main" xmlns:ma14="http://schemas.microsoft.com/office/mac/drawingml/2011/main" val="1"/>
+              <ma14:wrappingTextBoxFlag xmlns:ma14="http://schemas.microsoft.com/office/mac/drawingml/2011/main" xmlns:a14="http://schemas.microsoft.com/office/drawing/2010/main" xmlns:m="http://schemas.openxmlformats.org/officeDocument/2006/math" xmlns="" val="1"/>
             </a:ext>
           </a:extLst>
         </p:spPr>
@@ -19494,7 +19494,7 @@
           </a:ln>
           <a:extLst>
             <a:ext uri="{C572A759-6A51-4108-AA02-DFA0A04FC94B}">
-              <ma14:wrappingTextBoxFlag xmlns="" xmlns:m="http://schemas.openxmlformats.org/officeDocument/2006/math" xmlns:a14="http://schemas.microsoft.com/office/drawing/2010/main" xmlns:ma14="http://schemas.microsoft.com/office/mac/drawingml/2011/main" val="1"/>
+              <ma14:wrappingTextBoxFlag xmlns:ma14="http://schemas.microsoft.com/office/mac/drawingml/2011/main" xmlns:a14="http://schemas.microsoft.com/office/drawing/2010/main" xmlns:m="http://schemas.openxmlformats.org/officeDocument/2006/math" xmlns="" val="1"/>
             </a:ext>
           </a:extLst>
         </p:spPr>
@@ -19541,7 +19541,7 @@
           </a:ln>
           <a:extLst>
             <a:ext uri="{C572A759-6A51-4108-AA02-DFA0A04FC94B}">
-              <ma14:wrappingTextBoxFlag xmlns="" xmlns:m="http://schemas.openxmlformats.org/officeDocument/2006/math" xmlns:a14="http://schemas.microsoft.com/office/drawing/2010/main" xmlns:ma14="http://schemas.microsoft.com/office/mac/drawingml/2011/main" val="1"/>
+              <ma14:wrappingTextBoxFlag xmlns:ma14="http://schemas.microsoft.com/office/mac/drawingml/2011/main" xmlns:a14="http://schemas.microsoft.com/office/drawing/2010/main" xmlns:m="http://schemas.openxmlformats.org/officeDocument/2006/math" xmlns="" val="1"/>
             </a:ext>
           </a:extLst>
         </p:spPr>
@@ -20082,7 +20082,7 @@
           </a:ln>
           <a:extLst>
             <a:ext uri="{C572A759-6A51-4108-AA02-DFA0A04FC94B}">
-              <ma14:wrappingTextBoxFlag xmlns="" xmlns:m="http://schemas.openxmlformats.org/officeDocument/2006/math" xmlns:a14="http://schemas.microsoft.com/office/drawing/2010/main" xmlns:ma14="http://schemas.microsoft.com/office/mac/drawingml/2011/main" val="1"/>
+              <ma14:wrappingTextBoxFlag xmlns:ma14="http://schemas.microsoft.com/office/mac/drawingml/2011/main" xmlns:a14="http://schemas.microsoft.com/office/drawing/2010/main" xmlns:m="http://schemas.openxmlformats.org/officeDocument/2006/math" xmlns="" val="1"/>
             </a:ext>
           </a:extLst>
         </p:spPr>
@@ -21678,7 +21678,7 @@
           </a:ln>
           <a:extLst>
             <a:ext uri="{C572A759-6A51-4108-AA02-DFA0A04FC94B}">
-              <ma14:wrappingTextBoxFlag xmlns="" xmlns:m="http://schemas.openxmlformats.org/officeDocument/2006/math" xmlns:a14="http://schemas.microsoft.com/office/drawing/2010/main" xmlns:ma14="http://schemas.microsoft.com/office/mac/drawingml/2011/main" val="1"/>
+              <ma14:wrappingTextBoxFlag xmlns:ma14="http://schemas.microsoft.com/office/mac/drawingml/2011/main" xmlns:a14="http://schemas.microsoft.com/office/drawing/2010/main" xmlns:m="http://schemas.openxmlformats.org/officeDocument/2006/math" xmlns="" val="1"/>
             </a:ext>
           </a:extLst>
         </p:spPr>
@@ -24316,7 +24316,7 @@
           </a:ln>
           <a:extLst>
             <a:ext uri="{C572A759-6A51-4108-AA02-DFA0A04FC94B}">
-              <ma14:wrappingTextBoxFlag xmlns="" xmlns:m="http://schemas.openxmlformats.org/officeDocument/2006/math" xmlns:a14="http://schemas.microsoft.com/office/drawing/2010/main" xmlns:ma14="http://schemas.microsoft.com/office/mac/drawingml/2011/main" val="1"/>
+              <ma14:wrappingTextBoxFlag xmlns:ma14="http://schemas.microsoft.com/office/mac/drawingml/2011/main" xmlns:a14="http://schemas.microsoft.com/office/drawing/2010/main" xmlns:m="http://schemas.openxmlformats.org/officeDocument/2006/math" xmlns="" val="1"/>
             </a:ext>
           </a:extLst>
         </p:spPr>
@@ -24536,7 +24536,7 @@
           </a:ln>
           <a:extLst>
             <a:ext uri="{C572A759-6A51-4108-AA02-DFA0A04FC94B}">
-              <ma14:wrappingTextBoxFlag xmlns="" xmlns:m="http://schemas.openxmlformats.org/officeDocument/2006/math" xmlns:a14="http://schemas.microsoft.com/office/drawing/2010/main" xmlns:ma14="http://schemas.microsoft.com/office/mac/drawingml/2011/main" val="1"/>
+              <ma14:wrappingTextBoxFlag xmlns:ma14="http://schemas.microsoft.com/office/mac/drawingml/2011/main" xmlns:a14="http://schemas.microsoft.com/office/drawing/2010/main" xmlns:m="http://schemas.openxmlformats.org/officeDocument/2006/math" xmlns="" val="1"/>
             </a:ext>
           </a:extLst>
         </p:spPr>
@@ -25674,7 +25674,7 @@
           </a:ln>
           <a:extLst>
             <a:ext uri="{C572A759-6A51-4108-AA02-DFA0A04FC94B}">
-              <ma14:wrappingTextBoxFlag xmlns="" xmlns:m="http://schemas.openxmlformats.org/officeDocument/2006/math" xmlns:a14="http://schemas.microsoft.com/office/drawing/2010/main" xmlns:ma14="http://schemas.microsoft.com/office/mac/drawingml/2011/main" val="1"/>
+              <ma14:wrappingTextBoxFlag xmlns:ma14="http://schemas.microsoft.com/office/mac/drawingml/2011/main" xmlns:a14="http://schemas.microsoft.com/office/drawing/2010/main" xmlns:m="http://schemas.openxmlformats.org/officeDocument/2006/math" xmlns="" val="1"/>
             </a:ext>
           </a:extLst>
         </p:spPr>
@@ -25787,7 +25787,7 @@
           </a:ln>
           <a:extLst>
             <a:ext uri="{C572A759-6A51-4108-AA02-DFA0A04FC94B}">
-              <ma14:wrappingTextBoxFlag xmlns="" xmlns:m="http://schemas.openxmlformats.org/officeDocument/2006/math" xmlns:a14="http://schemas.microsoft.com/office/drawing/2010/main" xmlns:ma14="http://schemas.microsoft.com/office/mac/drawingml/2011/main" val="1"/>
+              <ma14:wrappingTextBoxFlag xmlns:ma14="http://schemas.microsoft.com/office/mac/drawingml/2011/main" xmlns:a14="http://schemas.microsoft.com/office/drawing/2010/main" xmlns:m="http://schemas.openxmlformats.org/officeDocument/2006/math" xmlns="" val="1"/>
             </a:ext>
           </a:extLst>
         </p:spPr>
@@ -25897,7 +25897,7 @@
           </a:ln>
           <a:extLst>
             <a:ext uri="{C572A759-6A51-4108-AA02-DFA0A04FC94B}">
-              <ma14:wrappingTextBoxFlag xmlns="" xmlns:m="http://schemas.openxmlformats.org/officeDocument/2006/math" xmlns:a14="http://schemas.microsoft.com/office/drawing/2010/main" xmlns:ma14="http://schemas.microsoft.com/office/mac/drawingml/2011/main" val="1"/>
+              <ma14:wrappingTextBoxFlag xmlns:ma14="http://schemas.microsoft.com/office/mac/drawingml/2011/main" xmlns:a14="http://schemas.microsoft.com/office/drawing/2010/main" xmlns:m="http://schemas.openxmlformats.org/officeDocument/2006/math" xmlns="" val="1"/>
             </a:ext>
           </a:extLst>
         </p:spPr>
@@ -28266,7 +28266,7 @@
           </a:ln>
           <a:extLst>
             <a:ext uri="{C572A759-6A51-4108-AA02-DFA0A04FC94B}">
-              <ma14:wrappingTextBoxFlag xmlns="" xmlns:m="http://schemas.openxmlformats.org/officeDocument/2006/math" xmlns:a14="http://schemas.microsoft.com/office/drawing/2010/main" xmlns:ma14="http://schemas.microsoft.com/office/mac/drawingml/2011/main" val="1"/>
+              <ma14:wrappingTextBoxFlag xmlns:ma14="http://schemas.microsoft.com/office/mac/drawingml/2011/main" xmlns:a14="http://schemas.microsoft.com/office/drawing/2010/main" xmlns:m="http://schemas.openxmlformats.org/officeDocument/2006/math" xmlns="" val="1"/>
             </a:ext>
           </a:extLst>
         </p:spPr>
@@ -28441,7 +28441,7 @@
           </a:ln>
           <a:extLst>
             <a:ext uri="{C572A759-6A51-4108-AA02-DFA0A04FC94B}">
-              <ma14:wrappingTextBoxFlag xmlns="" xmlns:m="http://schemas.openxmlformats.org/officeDocument/2006/math" xmlns:a14="http://schemas.microsoft.com/office/drawing/2010/main" xmlns:ma14="http://schemas.microsoft.com/office/mac/drawingml/2011/main" val="1"/>
+              <ma14:wrappingTextBoxFlag xmlns:ma14="http://schemas.microsoft.com/office/mac/drawingml/2011/main" xmlns:a14="http://schemas.microsoft.com/office/drawing/2010/main" xmlns:m="http://schemas.openxmlformats.org/officeDocument/2006/math" xmlns="" val="1"/>
             </a:ext>
           </a:extLst>
         </p:spPr>
@@ -28479,7 +28479,7 @@
           </a:ln>
           <a:extLst>
             <a:ext uri="{C572A759-6A51-4108-AA02-DFA0A04FC94B}">
-              <ma14:wrappingTextBoxFlag xmlns="" xmlns:m="http://schemas.openxmlformats.org/officeDocument/2006/math" xmlns:a14="http://schemas.microsoft.com/office/drawing/2010/main" xmlns:ma14="http://schemas.microsoft.com/office/mac/drawingml/2011/main" val="1"/>
+              <ma14:wrappingTextBoxFlag xmlns:ma14="http://schemas.microsoft.com/office/mac/drawingml/2011/main" xmlns:a14="http://schemas.microsoft.com/office/drawing/2010/main" xmlns:m="http://schemas.openxmlformats.org/officeDocument/2006/math" xmlns="" val="1"/>
             </a:ext>
           </a:extLst>
         </p:spPr>
@@ -28517,7 +28517,7 @@
           </a:ln>
           <a:extLst>
             <a:ext uri="{C572A759-6A51-4108-AA02-DFA0A04FC94B}">
-              <ma14:wrappingTextBoxFlag xmlns="" xmlns:m="http://schemas.openxmlformats.org/officeDocument/2006/math" xmlns:a14="http://schemas.microsoft.com/office/drawing/2010/main" xmlns:ma14="http://schemas.microsoft.com/office/mac/drawingml/2011/main" val="1"/>
+              <ma14:wrappingTextBoxFlag xmlns:ma14="http://schemas.microsoft.com/office/mac/drawingml/2011/main" xmlns:a14="http://schemas.microsoft.com/office/drawing/2010/main" xmlns:m="http://schemas.openxmlformats.org/officeDocument/2006/math" xmlns="" val="1"/>
             </a:ext>
           </a:extLst>
         </p:spPr>
@@ -28880,7 +28880,7 @@
           </a:ln>
           <a:extLst>
             <a:ext uri="{C572A759-6A51-4108-AA02-DFA0A04FC94B}">
-              <ma14:wrappingTextBoxFlag xmlns="" xmlns:m="http://schemas.openxmlformats.org/officeDocument/2006/math" xmlns:a14="http://schemas.microsoft.com/office/drawing/2010/main" xmlns:ma14="http://schemas.microsoft.com/office/mac/drawingml/2011/main" val="1"/>
+              <ma14:wrappingTextBoxFlag xmlns:ma14="http://schemas.microsoft.com/office/mac/drawingml/2011/main" xmlns:a14="http://schemas.microsoft.com/office/drawing/2010/main" xmlns:m="http://schemas.openxmlformats.org/officeDocument/2006/math" xmlns="" val="1"/>
             </a:ext>
           </a:extLst>
         </p:spPr>

</xml_diff>